<commit_message>
Added a model class dink Comment
</commit_message>
<xml_diff>
--- a/docs/wireframes/wireframes_BarApp.pptx
+++ b/docs/wireframes/wireframes_BarApp.pptx
@@ -9,6 +9,9 @@
     <p:sldId id="259" r:id="rId3"/>
     <p:sldId id="260" r:id="rId4"/>
     <p:sldId id="256" r:id="rId5"/>
+    <p:sldId id="262" r:id="rId6"/>
+    <p:sldId id="264" r:id="rId7"/>
+    <p:sldId id="263" r:id="rId8"/>
   </p:sldIdLst>
   <p:sldSz cx="12192000" cy="6858000"/>
   <p:notesSz cx="6858000" cy="9144000"/>
@@ -109,7 +112,18 @@
   </p:defaultTextStyle>
   <p:extLst>
     <p:ext uri="{EFAFB233-063F-42B5-8137-9DF3F51BA10A}">
-      <p15:sldGuideLst xmlns:p15="http://schemas.microsoft.com/office/powerpoint/2012/main" xmlns=""/>
+      <p15:sldGuideLst xmlns:p15="http://schemas.microsoft.com/office/powerpoint/2012/main">
+        <p15:guide id="1" orient="horz" pos="2160">
+          <p15:clr>
+            <a:srgbClr val="A4A3A4"/>
+          </p15:clr>
+        </p15:guide>
+        <p15:guide id="2" pos="3840">
+          <p15:clr>
+            <a:srgbClr val="A4A3A4"/>
+          </p15:clr>
+        </p15:guide>
+      </p15:sldGuideLst>
     </p:ext>
   </p:extLst>
 </p:presentation>
@@ -246,7 +260,7 @@
           <a:p>
             <a:fld id="{E739BB41-DB51-AC40-8BC3-82550C14AA6F}" type="datetimeFigureOut">
               <a:rPr lang="en-US" smtClean="0"/>
-              <a:t>4/6/2019</a:t>
+              <a:t>4/7/2019</a:t>
             </a:fld>
             <a:endParaRPr lang="en-US"/>
           </a:p>
@@ -416,7 +430,7 @@
           <a:p>
             <a:fld id="{E739BB41-DB51-AC40-8BC3-82550C14AA6F}" type="datetimeFigureOut">
               <a:rPr lang="en-US" smtClean="0"/>
-              <a:t>4/6/2019</a:t>
+              <a:t>4/7/2019</a:t>
             </a:fld>
             <a:endParaRPr lang="en-US"/>
           </a:p>
@@ -596,7 +610,7 @@
           <a:p>
             <a:fld id="{E739BB41-DB51-AC40-8BC3-82550C14AA6F}" type="datetimeFigureOut">
               <a:rPr lang="en-US" smtClean="0"/>
-              <a:t>4/6/2019</a:t>
+              <a:t>4/7/2019</a:t>
             </a:fld>
             <a:endParaRPr lang="en-US"/>
           </a:p>
@@ -766,7 +780,7 @@
           <a:p>
             <a:fld id="{E739BB41-DB51-AC40-8BC3-82550C14AA6F}" type="datetimeFigureOut">
               <a:rPr lang="en-US" smtClean="0"/>
-              <a:t>4/6/2019</a:t>
+              <a:t>4/7/2019</a:t>
             </a:fld>
             <a:endParaRPr lang="en-US"/>
           </a:p>
@@ -1012,7 +1026,7 @@
           <a:p>
             <a:fld id="{E739BB41-DB51-AC40-8BC3-82550C14AA6F}" type="datetimeFigureOut">
               <a:rPr lang="en-US" smtClean="0"/>
-              <a:t>4/6/2019</a:t>
+              <a:t>4/7/2019</a:t>
             </a:fld>
             <a:endParaRPr lang="en-US"/>
           </a:p>
@@ -1244,7 +1258,7 @@
           <a:p>
             <a:fld id="{E739BB41-DB51-AC40-8BC3-82550C14AA6F}" type="datetimeFigureOut">
               <a:rPr lang="en-US" smtClean="0"/>
-              <a:t>4/6/2019</a:t>
+              <a:t>4/7/2019</a:t>
             </a:fld>
             <a:endParaRPr lang="en-US"/>
           </a:p>
@@ -1611,7 +1625,7 @@
           <a:p>
             <a:fld id="{E739BB41-DB51-AC40-8BC3-82550C14AA6F}" type="datetimeFigureOut">
               <a:rPr lang="en-US" smtClean="0"/>
-              <a:t>4/6/2019</a:t>
+              <a:t>4/7/2019</a:t>
             </a:fld>
             <a:endParaRPr lang="en-US"/>
           </a:p>
@@ -1729,7 +1743,7 @@
           <a:p>
             <a:fld id="{E739BB41-DB51-AC40-8BC3-82550C14AA6F}" type="datetimeFigureOut">
               <a:rPr lang="en-US" smtClean="0"/>
-              <a:t>4/6/2019</a:t>
+              <a:t>4/7/2019</a:t>
             </a:fld>
             <a:endParaRPr lang="en-US"/>
           </a:p>
@@ -1824,7 +1838,7 @@
           <a:p>
             <a:fld id="{E739BB41-DB51-AC40-8BC3-82550C14AA6F}" type="datetimeFigureOut">
               <a:rPr lang="en-US" smtClean="0"/>
-              <a:t>4/6/2019</a:t>
+              <a:t>4/7/2019</a:t>
             </a:fld>
             <a:endParaRPr lang="en-US"/>
           </a:p>
@@ -2101,7 +2115,7 @@
           <a:p>
             <a:fld id="{E739BB41-DB51-AC40-8BC3-82550C14AA6F}" type="datetimeFigureOut">
               <a:rPr lang="en-US" smtClean="0"/>
-              <a:t>4/6/2019</a:t>
+              <a:t>4/7/2019</a:t>
             </a:fld>
             <a:endParaRPr lang="en-US"/>
           </a:p>
@@ -2358,7 +2372,7 @@
           <a:p>
             <a:fld id="{E739BB41-DB51-AC40-8BC3-82550C14AA6F}" type="datetimeFigureOut">
               <a:rPr lang="en-US" smtClean="0"/>
-              <a:t>4/6/2019</a:t>
+              <a:t>4/7/2019</a:t>
             </a:fld>
             <a:endParaRPr lang="en-US"/>
           </a:p>
@@ -2446,7 +2460,7 @@
           <p:cNvPr id="7" name="Picture 6">
             <a:extLst>
               <a:ext uri="{FF2B5EF4-FFF2-40B4-BE49-F238E27FC236}">
-                <a16:creationId xmlns:a16="http://schemas.microsoft.com/office/drawing/2014/main" xmlns="" id="{987A0DDE-E9C3-FE42-9929-DD9146A706AA}"/>
+                <a16:creationId xmlns:a16="http://schemas.microsoft.com/office/drawing/2014/main" id="{987A0DDE-E9C3-FE42-9929-DD9146A706AA}"/>
               </a:ext>
             </a:extLst>
           </p:cNvPr>
@@ -2476,7 +2490,7 @@
           <p:cNvPr id="8" name="Rectangle 7">
             <a:extLst>
               <a:ext uri="{FF2B5EF4-FFF2-40B4-BE49-F238E27FC236}">
-                <a16:creationId xmlns:a16="http://schemas.microsoft.com/office/drawing/2014/main" xmlns="" id="{81BD0B67-76E8-FD41-A66D-BE4915F50BFC}"/>
+                <a16:creationId xmlns:a16="http://schemas.microsoft.com/office/drawing/2014/main" id="{81BD0B67-76E8-FD41-A66D-BE4915F50BFC}"/>
               </a:ext>
             </a:extLst>
           </p:cNvPr>
@@ -2528,7 +2542,7 @@
           <p:cNvPr id="9" name="Rectangle 8">
             <a:extLst>
               <a:ext uri="{FF2B5EF4-FFF2-40B4-BE49-F238E27FC236}">
-                <a16:creationId xmlns:a16="http://schemas.microsoft.com/office/drawing/2014/main" xmlns="" id="{3BF477E5-BB1D-1541-B34B-AFABF28A0D14}"/>
+                <a16:creationId xmlns:a16="http://schemas.microsoft.com/office/drawing/2014/main" id="{3BF477E5-BB1D-1541-B34B-AFABF28A0D14}"/>
               </a:ext>
             </a:extLst>
           </p:cNvPr>
@@ -2704,7 +2718,7 @@
           <a:p>
             <a:fld id="{E739BB41-DB51-AC40-8BC3-82550C14AA6F}" type="datetimeFigureOut">
               <a:rPr lang="en-US" smtClean="0"/>
-              <a:t>4/6/2019</a:t>
+              <a:t>4/7/2019</a:t>
             </a:fld>
             <a:endParaRPr lang="en-US"/>
           </a:p>
@@ -3455,10 +3469,220 @@
           </a:extLst>
         </p:spPr>
       </p:pic>
+      <p:pic>
+        <p:nvPicPr>
+          <p:cNvPr id="2" name="Picture 1">
+            <a:extLst>
+              <a:ext uri="{FF2B5EF4-FFF2-40B4-BE49-F238E27FC236}">
+                <a16:creationId xmlns:a16="http://schemas.microsoft.com/office/drawing/2014/main" id="{5B9CE314-C192-4C34-9280-5614D90B55BB}"/>
+              </a:ext>
+            </a:extLst>
+          </p:cNvPr>
+          <p:cNvPicPr>
+            <a:picLocks noChangeAspect="1"/>
+          </p:cNvPicPr>
+          <p:nvPr/>
+        </p:nvPicPr>
+        <p:blipFill>
+          <a:blip r:embed="rId3"/>
+          <a:stretch>
+            <a:fillRect/>
+          </a:stretch>
+        </p:blipFill>
+        <p:spPr>
+          <a:xfrm>
+            <a:off x="0" y="0"/>
+            <a:ext cx="12192000" cy="6858000"/>
+          </a:xfrm>
+          <a:prstGeom prst="rect">
+            <a:avLst/>
+          </a:prstGeom>
+        </p:spPr>
+      </p:pic>
     </p:spTree>
     <p:extLst>
       <p:ext uri="{BB962C8B-B14F-4D97-AF65-F5344CB8AC3E}">
         <p14:creationId xmlns:p14="http://schemas.microsoft.com/office/powerpoint/2010/main" val="800410531"/>
+      </p:ext>
+    </p:extLst>
+  </p:cSld>
+  <p:clrMapOvr>
+    <a:masterClrMapping/>
+  </p:clrMapOvr>
+</p:sld>
+</file>
+
+<file path=ppt/slides/slide5.xml><?xml version="1.0" encoding="utf-8"?>
+<p:sld xmlns:a="http://schemas.openxmlformats.org/drawingml/2006/main" xmlns:r="http://schemas.openxmlformats.org/officeDocument/2006/relationships" xmlns:p="http://schemas.openxmlformats.org/presentationml/2006/main">
+  <p:cSld>
+    <p:spTree>
+      <p:nvGrpSpPr>
+        <p:cNvPr id="1" name=""/>
+        <p:cNvGrpSpPr/>
+        <p:nvPr/>
+      </p:nvGrpSpPr>
+      <p:grpSpPr>
+        <a:xfrm>
+          <a:off x="0" y="0"/>
+          <a:ext cx="0" cy="0"/>
+          <a:chOff x="0" y="0"/>
+          <a:chExt cx="0" cy="0"/>
+        </a:xfrm>
+      </p:grpSpPr>
+      <p:pic>
+        <p:nvPicPr>
+          <p:cNvPr id="2" name="Picture 1">
+            <a:extLst>
+              <a:ext uri="{FF2B5EF4-FFF2-40B4-BE49-F238E27FC236}">
+                <a16:creationId xmlns:a16="http://schemas.microsoft.com/office/drawing/2014/main" id="{CAD8E0E2-C4FF-4663-9D9A-DAA509DF9D83}"/>
+              </a:ext>
+            </a:extLst>
+          </p:cNvPr>
+          <p:cNvPicPr>
+            <a:picLocks noChangeAspect="1"/>
+          </p:cNvPicPr>
+          <p:nvPr/>
+        </p:nvPicPr>
+        <p:blipFill>
+          <a:blip r:embed="rId2"/>
+          <a:stretch>
+            <a:fillRect/>
+          </a:stretch>
+        </p:blipFill>
+        <p:spPr>
+          <a:xfrm>
+            <a:off x="1168400" y="850900"/>
+            <a:ext cx="9855200" cy="5626100"/>
+          </a:xfrm>
+          <a:prstGeom prst="rect">
+            <a:avLst/>
+          </a:prstGeom>
+        </p:spPr>
+      </p:pic>
+    </p:spTree>
+    <p:extLst>
+      <p:ext uri="{BB962C8B-B14F-4D97-AF65-F5344CB8AC3E}">
+        <p14:creationId xmlns:p14="http://schemas.microsoft.com/office/powerpoint/2010/main" val="2773921431"/>
+      </p:ext>
+    </p:extLst>
+  </p:cSld>
+  <p:clrMapOvr>
+    <a:masterClrMapping/>
+  </p:clrMapOvr>
+</p:sld>
+</file>
+
+<file path=ppt/slides/slide6.xml><?xml version="1.0" encoding="utf-8"?>
+<p:sld xmlns:a="http://schemas.openxmlformats.org/drawingml/2006/main" xmlns:r="http://schemas.openxmlformats.org/officeDocument/2006/relationships" xmlns:p="http://schemas.openxmlformats.org/presentationml/2006/main">
+  <p:cSld>
+    <p:spTree>
+      <p:nvGrpSpPr>
+        <p:cNvPr id="1" name=""/>
+        <p:cNvGrpSpPr/>
+        <p:nvPr/>
+      </p:nvGrpSpPr>
+      <p:grpSpPr>
+        <a:xfrm>
+          <a:off x="0" y="0"/>
+          <a:ext cx="0" cy="0"/>
+          <a:chOff x="0" y="0"/>
+          <a:chExt cx="0" cy="0"/>
+        </a:xfrm>
+      </p:grpSpPr>
+      <p:pic>
+        <p:nvPicPr>
+          <p:cNvPr id="3" name="Picture 2">
+            <a:extLst>
+              <a:ext uri="{FF2B5EF4-FFF2-40B4-BE49-F238E27FC236}">
+                <a16:creationId xmlns:a16="http://schemas.microsoft.com/office/drawing/2014/main" id="{8490383D-03B0-43E0-A98C-567D6FFAB3A3}"/>
+              </a:ext>
+            </a:extLst>
+          </p:cNvPr>
+          <p:cNvPicPr>
+            <a:picLocks noChangeAspect="1"/>
+          </p:cNvPicPr>
+          <p:nvPr/>
+        </p:nvPicPr>
+        <p:blipFill>
+          <a:blip r:embed="rId2"/>
+          <a:stretch>
+            <a:fillRect/>
+          </a:stretch>
+        </p:blipFill>
+        <p:spPr>
+          <a:xfrm>
+            <a:off x="1149350" y="901700"/>
+            <a:ext cx="6819900" cy="1524000"/>
+          </a:xfrm>
+          <a:prstGeom prst="rect">
+            <a:avLst/>
+          </a:prstGeom>
+        </p:spPr>
+      </p:pic>
+    </p:spTree>
+    <p:extLst>
+      <p:ext uri="{BB962C8B-B14F-4D97-AF65-F5344CB8AC3E}">
+        <p14:creationId xmlns:p14="http://schemas.microsoft.com/office/powerpoint/2010/main" val="2147978175"/>
+      </p:ext>
+    </p:extLst>
+  </p:cSld>
+  <p:clrMapOvr>
+    <a:masterClrMapping/>
+  </p:clrMapOvr>
+</p:sld>
+</file>
+
+<file path=ppt/slides/slide7.xml><?xml version="1.0" encoding="utf-8"?>
+<p:sld xmlns:a="http://schemas.openxmlformats.org/drawingml/2006/main" xmlns:r="http://schemas.openxmlformats.org/officeDocument/2006/relationships" xmlns:p="http://schemas.openxmlformats.org/presentationml/2006/main">
+  <p:cSld>
+    <p:spTree>
+      <p:nvGrpSpPr>
+        <p:cNvPr id="1" name=""/>
+        <p:cNvGrpSpPr/>
+        <p:nvPr/>
+      </p:nvGrpSpPr>
+      <p:grpSpPr>
+        <a:xfrm>
+          <a:off x="0" y="0"/>
+          <a:ext cx="0" cy="0"/>
+          <a:chOff x="0" y="0"/>
+          <a:chExt cx="0" cy="0"/>
+        </a:xfrm>
+      </p:grpSpPr>
+      <p:pic>
+        <p:nvPicPr>
+          <p:cNvPr id="2" name="Picture 1">
+            <a:extLst>
+              <a:ext uri="{FF2B5EF4-FFF2-40B4-BE49-F238E27FC236}">
+                <a16:creationId xmlns:a16="http://schemas.microsoft.com/office/drawing/2014/main" id="{61EA8896-9FB3-4FDB-BF17-0FB14DDBD163}"/>
+              </a:ext>
+            </a:extLst>
+          </p:cNvPr>
+          <p:cNvPicPr>
+            <a:picLocks noChangeAspect="1"/>
+          </p:cNvPicPr>
+          <p:nvPr/>
+        </p:nvPicPr>
+        <p:blipFill>
+          <a:blip r:embed="rId2"/>
+          <a:stretch>
+            <a:fillRect/>
+          </a:stretch>
+        </p:blipFill>
+        <p:spPr>
+          <a:xfrm>
+            <a:off x="0" y="190500"/>
+            <a:ext cx="12192000" cy="6667500"/>
+          </a:xfrm>
+          <a:prstGeom prst="rect">
+            <a:avLst/>
+          </a:prstGeom>
+        </p:spPr>
+      </p:pic>
+    </p:spTree>
+    <p:extLst>
+      <p:ext uri="{BB962C8B-B14F-4D97-AF65-F5344CB8AC3E}">
+        <p14:creationId xmlns:p14="http://schemas.microsoft.com/office/powerpoint/2010/main" val="2655653562"/>
       </p:ext>
     </p:extLst>
   </p:cSld>
@@ -3742,7 +3966,7 @@
   <a:extraClrSchemeLst/>
   <a:extLst>
     <a:ext uri="{05A4C25C-085E-4340-85A3-A5531E510DB2}">
-      <thm15:themeFamily xmlns:thm15="http://schemas.microsoft.com/office/thememl/2012/main" xmlns="" name="Office Theme" id="{62F939B6-93AF-4DB8-9C6B-D6C7DFDC589F}" vid="{4F46216B-77A9-411A-B9D3-5023FCB70208}"/>
+      <thm15:themeFamily xmlns:thm15="http://schemas.microsoft.com/office/thememl/2012/main" name="Office Theme" id="{62F939B6-93AF-4DB8-9C6B-D6C7DFDC589F}" vid="{4F46216B-77A9-411A-B9D3-5023FCB70208}"/>
     </a:ext>
   </a:extLst>
 </a:theme>

</xml_diff>

<commit_message>
added a new recipe salted lassi and make an association with drink comment d4
</commit_message>
<xml_diff>
--- a/docs/wireframes/wireframes_BarApp.pptx
+++ b/docs/wireframes/wireframes_BarApp.pptx
@@ -9,6 +9,9 @@
     <p:sldId id="259" r:id="rId3"/>
     <p:sldId id="260" r:id="rId4"/>
     <p:sldId id="256" r:id="rId5"/>
+    <p:sldId id="262" r:id="rId6"/>
+    <p:sldId id="264" r:id="rId7"/>
+    <p:sldId id="263" r:id="rId8"/>
   </p:sldIdLst>
   <p:sldSz cx="12192000" cy="6858000"/>
   <p:notesSz cx="6858000" cy="9144000"/>
@@ -109,7 +112,18 @@
   </p:defaultTextStyle>
   <p:extLst>
     <p:ext uri="{EFAFB233-063F-42B5-8137-9DF3F51BA10A}">
-      <p15:sldGuideLst xmlns:p15="http://schemas.microsoft.com/office/powerpoint/2012/main" xmlns=""/>
+      <p15:sldGuideLst xmlns:p15="http://schemas.microsoft.com/office/powerpoint/2012/main">
+        <p15:guide id="1" orient="horz" pos="2160">
+          <p15:clr>
+            <a:srgbClr val="A4A3A4"/>
+          </p15:clr>
+        </p15:guide>
+        <p15:guide id="2" pos="3840">
+          <p15:clr>
+            <a:srgbClr val="A4A3A4"/>
+          </p15:clr>
+        </p15:guide>
+      </p15:sldGuideLst>
     </p:ext>
   </p:extLst>
 </p:presentation>
@@ -246,7 +260,7 @@
           <a:p>
             <a:fld id="{E739BB41-DB51-AC40-8BC3-82550C14AA6F}" type="datetimeFigureOut">
               <a:rPr lang="en-US" smtClean="0"/>
-              <a:t>4/6/2019</a:t>
+              <a:t>4/7/2019</a:t>
             </a:fld>
             <a:endParaRPr lang="en-US"/>
           </a:p>
@@ -416,7 +430,7 @@
           <a:p>
             <a:fld id="{E739BB41-DB51-AC40-8BC3-82550C14AA6F}" type="datetimeFigureOut">
               <a:rPr lang="en-US" smtClean="0"/>
-              <a:t>4/6/2019</a:t>
+              <a:t>4/7/2019</a:t>
             </a:fld>
             <a:endParaRPr lang="en-US"/>
           </a:p>
@@ -596,7 +610,7 @@
           <a:p>
             <a:fld id="{E739BB41-DB51-AC40-8BC3-82550C14AA6F}" type="datetimeFigureOut">
               <a:rPr lang="en-US" smtClean="0"/>
-              <a:t>4/6/2019</a:t>
+              <a:t>4/7/2019</a:t>
             </a:fld>
             <a:endParaRPr lang="en-US"/>
           </a:p>
@@ -766,7 +780,7 @@
           <a:p>
             <a:fld id="{E739BB41-DB51-AC40-8BC3-82550C14AA6F}" type="datetimeFigureOut">
               <a:rPr lang="en-US" smtClean="0"/>
-              <a:t>4/6/2019</a:t>
+              <a:t>4/7/2019</a:t>
             </a:fld>
             <a:endParaRPr lang="en-US"/>
           </a:p>
@@ -1012,7 +1026,7 @@
           <a:p>
             <a:fld id="{E739BB41-DB51-AC40-8BC3-82550C14AA6F}" type="datetimeFigureOut">
               <a:rPr lang="en-US" smtClean="0"/>
-              <a:t>4/6/2019</a:t>
+              <a:t>4/7/2019</a:t>
             </a:fld>
             <a:endParaRPr lang="en-US"/>
           </a:p>
@@ -1244,7 +1258,7 @@
           <a:p>
             <a:fld id="{E739BB41-DB51-AC40-8BC3-82550C14AA6F}" type="datetimeFigureOut">
               <a:rPr lang="en-US" smtClean="0"/>
-              <a:t>4/6/2019</a:t>
+              <a:t>4/7/2019</a:t>
             </a:fld>
             <a:endParaRPr lang="en-US"/>
           </a:p>
@@ -1611,7 +1625,7 @@
           <a:p>
             <a:fld id="{E739BB41-DB51-AC40-8BC3-82550C14AA6F}" type="datetimeFigureOut">
               <a:rPr lang="en-US" smtClean="0"/>
-              <a:t>4/6/2019</a:t>
+              <a:t>4/7/2019</a:t>
             </a:fld>
             <a:endParaRPr lang="en-US"/>
           </a:p>
@@ -1729,7 +1743,7 @@
           <a:p>
             <a:fld id="{E739BB41-DB51-AC40-8BC3-82550C14AA6F}" type="datetimeFigureOut">
               <a:rPr lang="en-US" smtClean="0"/>
-              <a:t>4/6/2019</a:t>
+              <a:t>4/7/2019</a:t>
             </a:fld>
             <a:endParaRPr lang="en-US"/>
           </a:p>
@@ -1824,7 +1838,7 @@
           <a:p>
             <a:fld id="{E739BB41-DB51-AC40-8BC3-82550C14AA6F}" type="datetimeFigureOut">
               <a:rPr lang="en-US" smtClean="0"/>
-              <a:t>4/6/2019</a:t>
+              <a:t>4/7/2019</a:t>
             </a:fld>
             <a:endParaRPr lang="en-US"/>
           </a:p>
@@ -2101,7 +2115,7 @@
           <a:p>
             <a:fld id="{E739BB41-DB51-AC40-8BC3-82550C14AA6F}" type="datetimeFigureOut">
               <a:rPr lang="en-US" smtClean="0"/>
-              <a:t>4/6/2019</a:t>
+              <a:t>4/7/2019</a:t>
             </a:fld>
             <a:endParaRPr lang="en-US"/>
           </a:p>
@@ -2358,7 +2372,7 @@
           <a:p>
             <a:fld id="{E739BB41-DB51-AC40-8BC3-82550C14AA6F}" type="datetimeFigureOut">
               <a:rPr lang="en-US" smtClean="0"/>
-              <a:t>4/6/2019</a:t>
+              <a:t>4/7/2019</a:t>
             </a:fld>
             <a:endParaRPr lang="en-US"/>
           </a:p>
@@ -2446,7 +2460,7 @@
           <p:cNvPr id="7" name="Picture 6">
             <a:extLst>
               <a:ext uri="{FF2B5EF4-FFF2-40B4-BE49-F238E27FC236}">
-                <a16:creationId xmlns:a16="http://schemas.microsoft.com/office/drawing/2014/main" xmlns="" id="{987A0DDE-E9C3-FE42-9929-DD9146A706AA}"/>
+                <a16:creationId xmlns:a16="http://schemas.microsoft.com/office/drawing/2014/main" id="{987A0DDE-E9C3-FE42-9929-DD9146A706AA}"/>
               </a:ext>
             </a:extLst>
           </p:cNvPr>
@@ -2476,7 +2490,7 @@
           <p:cNvPr id="8" name="Rectangle 7">
             <a:extLst>
               <a:ext uri="{FF2B5EF4-FFF2-40B4-BE49-F238E27FC236}">
-                <a16:creationId xmlns:a16="http://schemas.microsoft.com/office/drawing/2014/main" xmlns="" id="{81BD0B67-76E8-FD41-A66D-BE4915F50BFC}"/>
+                <a16:creationId xmlns:a16="http://schemas.microsoft.com/office/drawing/2014/main" id="{81BD0B67-76E8-FD41-A66D-BE4915F50BFC}"/>
               </a:ext>
             </a:extLst>
           </p:cNvPr>
@@ -2528,7 +2542,7 @@
           <p:cNvPr id="9" name="Rectangle 8">
             <a:extLst>
               <a:ext uri="{FF2B5EF4-FFF2-40B4-BE49-F238E27FC236}">
-                <a16:creationId xmlns:a16="http://schemas.microsoft.com/office/drawing/2014/main" xmlns="" id="{3BF477E5-BB1D-1541-B34B-AFABF28A0D14}"/>
+                <a16:creationId xmlns:a16="http://schemas.microsoft.com/office/drawing/2014/main" id="{3BF477E5-BB1D-1541-B34B-AFABF28A0D14}"/>
               </a:ext>
             </a:extLst>
           </p:cNvPr>
@@ -2704,7 +2718,7 @@
           <a:p>
             <a:fld id="{E739BB41-DB51-AC40-8BC3-82550C14AA6F}" type="datetimeFigureOut">
               <a:rPr lang="en-US" smtClean="0"/>
-              <a:t>4/6/2019</a:t>
+              <a:t>4/7/2019</a:t>
             </a:fld>
             <a:endParaRPr lang="en-US"/>
           </a:p>
@@ -3455,10 +3469,220 @@
           </a:extLst>
         </p:spPr>
       </p:pic>
+      <p:pic>
+        <p:nvPicPr>
+          <p:cNvPr id="2" name="Picture 1">
+            <a:extLst>
+              <a:ext uri="{FF2B5EF4-FFF2-40B4-BE49-F238E27FC236}">
+                <a16:creationId xmlns:a16="http://schemas.microsoft.com/office/drawing/2014/main" id="{5B9CE314-C192-4C34-9280-5614D90B55BB}"/>
+              </a:ext>
+            </a:extLst>
+          </p:cNvPr>
+          <p:cNvPicPr>
+            <a:picLocks noChangeAspect="1"/>
+          </p:cNvPicPr>
+          <p:nvPr/>
+        </p:nvPicPr>
+        <p:blipFill>
+          <a:blip r:embed="rId3"/>
+          <a:stretch>
+            <a:fillRect/>
+          </a:stretch>
+        </p:blipFill>
+        <p:spPr>
+          <a:xfrm>
+            <a:off x="0" y="0"/>
+            <a:ext cx="12192000" cy="6858000"/>
+          </a:xfrm>
+          <a:prstGeom prst="rect">
+            <a:avLst/>
+          </a:prstGeom>
+        </p:spPr>
+      </p:pic>
     </p:spTree>
     <p:extLst>
       <p:ext uri="{BB962C8B-B14F-4D97-AF65-F5344CB8AC3E}">
         <p14:creationId xmlns:p14="http://schemas.microsoft.com/office/powerpoint/2010/main" val="800410531"/>
+      </p:ext>
+    </p:extLst>
+  </p:cSld>
+  <p:clrMapOvr>
+    <a:masterClrMapping/>
+  </p:clrMapOvr>
+</p:sld>
+</file>
+
+<file path=ppt/slides/slide5.xml><?xml version="1.0" encoding="utf-8"?>
+<p:sld xmlns:a="http://schemas.openxmlformats.org/drawingml/2006/main" xmlns:r="http://schemas.openxmlformats.org/officeDocument/2006/relationships" xmlns:p="http://schemas.openxmlformats.org/presentationml/2006/main">
+  <p:cSld>
+    <p:spTree>
+      <p:nvGrpSpPr>
+        <p:cNvPr id="1" name=""/>
+        <p:cNvGrpSpPr/>
+        <p:nvPr/>
+      </p:nvGrpSpPr>
+      <p:grpSpPr>
+        <a:xfrm>
+          <a:off x="0" y="0"/>
+          <a:ext cx="0" cy="0"/>
+          <a:chOff x="0" y="0"/>
+          <a:chExt cx="0" cy="0"/>
+        </a:xfrm>
+      </p:grpSpPr>
+      <p:pic>
+        <p:nvPicPr>
+          <p:cNvPr id="2" name="Picture 1">
+            <a:extLst>
+              <a:ext uri="{FF2B5EF4-FFF2-40B4-BE49-F238E27FC236}">
+                <a16:creationId xmlns:a16="http://schemas.microsoft.com/office/drawing/2014/main" id="{CAD8E0E2-C4FF-4663-9D9A-DAA509DF9D83}"/>
+              </a:ext>
+            </a:extLst>
+          </p:cNvPr>
+          <p:cNvPicPr>
+            <a:picLocks noChangeAspect="1"/>
+          </p:cNvPicPr>
+          <p:nvPr/>
+        </p:nvPicPr>
+        <p:blipFill>
+          <a:blip r:embed="rId2"/>
+          <a:stretch>
+            <a:fillRect/>
+          </a:stretch>
+        </p:blipFill>
+        <p:spPr>
+          <a:xfrm>
+            <a:off x="1168400" y="850900"/>
+            <a:ext cx="9855200" cy="5626100"/>
+          </a:xfrm>
+          <a:prstGeom prst="rect">
+            <a:avLst/>
+          </a:prstGeom>
+        </p:spPr>
+      </p:pic>
+    </p:spTree>
+    <p:extLst>
+      <p:ext uri="{BB962C8B-B14F-4D97-AF65-F5344CB8AC3E}">
+        <p14:creationId xmlns:p14="http://schemas.microsoft.com/office/powerpoint/2010/main" val="2773921431"/>
+      </p:ext>
+    </p:extLst>
+  </p:cSld>
+  <p:clrMapOvr>
+    <a:masterClrMapping/>
+  </p:clrMapOvr>
+</p:sld>
+</file>
+
+<file path=ppt/slides/slide6.xml><?xml version="1.0" encoding="utf-8"?>
+<p:sld xmlns:a="http://schemas.openxmlformats.org/drawingml/2006/main" xmlns:r="http://schemas.openxmlformats.org/officeDocument/2006/relationships" xmlns:p="http://schemas.openxmlformats.org/presentationml/2006/main">
+  <p:cSld>
+    <p:spTree>
+      <p:nvGrpSpPr>
+        <p:cNvPr id="1" name=""/>
+        <p:cNvGrpSpPr/>
+        <p:nvPr/>
+      </p:nvGrpSpPr>
+      <p:grpSpPr>
+        <a:xfrm>
+          <a:off x="0" y="0"/>
+          <a:ext cx="0" cy="0"/>
+          <a:chOff x="0" y="0"/>
+          <a:chExt cx="0" cy="0"/>
+        </a:xfrm>
+      </p:grpSpPr>
+      <p:pic>
+        <p:nvPicPr>
+          <p:cNvPr id="3" name="Picture 2">
+            <a:extLst>
+              <a:ext uri="{FF2B5EF4-FFF2-40B4-BE49-F238E27FC236}">
+                <a16:creationId xmlns:a16="http://schemas.microsoft.com/office/drawing/2014/main" id="{8490383D-03B0-43E0-A98C-567D6FFAB3A3}"/>
+              </a:ext>
+            </a:extLst>
+          </p:cNvPr>
+          <p:cNvPicPr>
+            <a:picLocks noChangeAspect="1"/>
+          </p:cNvPicPr>
+          <p:nvPr/>
+        </p:nvPicPr>
+        <p:blipFill>
+          <a:blip r:embed="rId2"/>
+          <a:stretch>
+            <a:fillRect/>
+          </a:stretch>
+        </p:blipFill>
+        <p:spPr>
+          <a:xfrm>
+            <a:off x="1149350" y="901700"/>
+            <a:ext cx="6819900" cy="1524000"/>
+          </a:xfrm>
+          <a:prstGeom prst="rect">
+            <a:avLst/>
+          </a:prstGeom>
+        </p:spPr>
+      </p:pic>
+    </p:spTree>
+    <p:extLst>
+      <p:ext uri="{BB962C8B-B14F-4D97-AF65-F5344CB8AC3E}">
+        <p14:creationId xmlns:p14="http://schemas.microsoft.com/office/powerpoint/2010/main" val="2147978175"/>
+      </p:ext>
+    </p:extLst>
+  </p:cSld>
+  <p:clrMapOvr>
+    <a:masterClrMapping/>
+  </p:clrMapOvr>
+</p:sld>
+</file>
+
+<file path=ppt/slides/slide7.xml><?xml version="1.0" encoding="utf-8"?>
+<p:sld xmlns:a="http://schemas.openxmlformats.org/drawingml/2006/main" xmlns:r="http://schemas.openxmlformats.org/officeDocument/2006/relationships" xmlns:p="http://schemas.openxmlformats.org/presentationml/2006/main">
+  <p:cSld>
+    <p:spTree>
+      <p:nvGrpSpPr>
+        <p:cNvPr id="1" name=""/>
+        <p:cNvGrpSpPr/>
+        <p:nvPr/>
+      </p:nvGrpSpPr>
+      <p:grpSpPr>
+        <a:xfrm>
+          <a:off x="0" y="0"/>
+          <a:ext cx="0" cy="0"/>
+          <a:chOff x="0" y="0"/>
+          <a:chExt cx="0" cy="0"/>
+        </a:xfrm>
+      </p:grpSpPr>
+      <p:pic>
+        <p:nvPicPr>
+          <p:cNvPr id="2" name="Picture 1">
+            <a:extLst>
+              <a:ext uri="{FF2B5EF4-FFF2-40B4-BE49-F238E27FC236}">
+                <a16:creationId xmlns:a16="http://schemas.microsoft.com/office/drawing/2014/main" id="{61EA8896-9FB3-4FDB-BF17-0FB14DDBD163}"/>
+              </a:ext>
+            </a:extLst>
+          </p:cNvPr>
+          <p:cNvPicPr>
+            <a:picLocks noChangeAspect="1"/>
+          </p:cNvPicPr>
+          <p:nvPr/>
+        </p:nvPicPr>
+        <p:blipFill>
+          <a:blip r:embed="rId2"/>
+          <a:stretch>
+            <a:fillRect/>
+          </a:stretch>
+        </p:blipFill>
+        <p:spPr>
+          <a:xfrm>
+            <a:off x="0" y="190500"/>
+            <a:ext cx="12192000" cy="6667500"/>
+          </a:xfrm>
+          <a:prstGeom prst="rect">
+            <a:avLst/>
+          </a:prstGeom>
+        </p:spPr>
+      </p:pic>
+    </p:spTree>
+    <p:extLst>
+      <p:ext uri="{BB962C8B-B14F-4D97-AF65-F5344CB8AC3E}">
+        <p14:creationId xmlns:p14="http://schemas.microsoft.com/office/powerpoint/2010/main" val="2655653562"/>
       </p:ext>
     </p:extLst>
   </p:cSld>
@@ -3742,7 +3966,7 @@
   <a:extraClrSchemeLst/>
   <a:extLst>
     <a:ext uri="{05A4C25C-085E-4340-85A3-A5531E510DB2}">
-      <thm15:themeFamily xmlns:thm15="http://schemas.microsoft.com/office/thememl/2012/main" xmlns="" name="Office Theme" id="{62F939B6-93AF-4DB8-9C6B-D6C7DFDC589F}" vid="{4F46216B-77A9-411A-B9D3-5023FCB70208}"/>
+      <thm15:themeFamily xmlns:thm15="http://schemas.microsoft.com/office/thememl/2012/main" name="Office Theme" id="{62F939B6-93AF-4DB8-9C6B-D6C7DFDC589F}" vid="{4F46216B-77A9-411A-B9D3-5023FCB70208}"/>
     </a:ext>
   </a:extLst>
 </a:theme>

</xml_diff>